<commit_message>
implemented sorting of slides basde on cofig file setting
</commit_message>
<xml_diff>
--- a/output/Report_09-02-2019.pptx
+++ b/output/Report_09-02-2019.pptx
@@ -6,6 +6,7 @@
   </p:sldMasterIdLst>
   <p:sldIdLst>
     <p:sldId id="256" r:id="rId7"/>
+    <p:sldId id="257" r:id="rId8"/>
   </p:sldIdLst>
   <p:sldSz cx="9144000" cy="6858000" type="screen4x3"/>
   <p:notesSz cx="6858000" cy="9144000"/>
@@ -3119,7 +3120,78 @@
       </p:sp>
       <p:pic>
         <p:nvPicPr>
-          <p:cNvPr id="3" name="Picture 2" descr="pic1.png"/>
+          <p:cNvPr id="3" name="Picture 2" descr="Board CPU Load.png"/>
+          <p:cNvPicPr>
+            <a:picLocks noChangeAspect="1"/>
+          </p:cNvPicPr>
+          <p:nvPr/>
+        </p:nvPicPr>
+        <p:blipFill>
+          <a:blip r:embed="rId2"/>
+          <a:stretch>
+            <a:fillRect/>
+          </a:stretch>
+        </p:blipFill>
+        <p:spPr>
+          <a:xfrm>
+            <a:off x="9144" y="457200"/>
+            <a:ext cx="9134856" cy="6126480"/>
+          </a:xfrm>
+          <a:prstGeom prst="rect">
+            <a:avLst/>
+          </a:prstGeom>
+        </p:spPr>
+      </p:pic>
+    </p:spTree>
+  </p:cSld>
+  <p:clrMapOvr>
+    <a:masterClrMapping/>
+  </p:clrMapOvr>
+</p:sld>
+</file>
+
+<file path=ppt/slides/slide2.xml><?xml version="1.0" encoding="utf-8"?>
+<p:sld xmlns:a="http://schemas.openxmlformats.org/drawingml/2006/main" xmlns:p="http://schemas.openxmlformats.org/presentationml/2006/main" xmlns:r="http://schemas.openxmlformats.org/officeDocument/2006/relationships">
+  <p:cSld>
+    <p:spTree>
+      <p:nvGrpSpPr>
+        <p:cNvPr id="1" name=""/>
+        <p:cNvGrpSpPr/>
+        <p:nvPr/>
+      </p:nvGrpSpPr>
+      <p:grpSpPr/>
+      <p:sp>
+        <p:nvSpPr>
+          <p:cNvPr id="2" name="Title 1"/>
+          <p:cNvSpPr>
+            <a:spLocks noGrp="1"/>
+          </p:cNvSpPr>
+          <p:nvPr>
+            <p:ph type="title"/>
+          </p:nvPr>
+        </p:nvSpPr>
+        <p:spPr>
+          <a:xfrm>
+            <a:off x="0" y="0"/>
+            <a:ext cx="9144000" cy="457200"/>
+          </a:xfrm>
+        </p:spPr>
+        <p:txBody>
+          <a:bodyPr/>
+          <a:lstStyle/>
+          <a:p>
+            <a:pPr>
+              <a:defRPr sz="1400" b="1"/>
+            </a:pPr>
+            <a:r>
+              <a:t>Board shit Load</a:t>
+            </a:r>
+          </a:p>
+        </p:txBody>
+      </p:sp>
+      <p:pic>
+        <p:nvPicPr>
+          <p:cNvPr id="3" name="Picture 2" descr="Board shit Load.png"/>
           <p:cNvPicPr>
             <a:picLocks noChangeAspect="1"/>
           </p:cNvPicPr>

</xml_diff>